<commit_message>
update lab03 examples and slide order
</commit_message>
<xml_diff>
--- a/labs/lab03/Lab3.pptx
+++ b/labs/lab03/Lab3.pptx
@@ -5,19 +5,20 @@
     <p:sldMasterId id="2147483648" r:id="rId1"/>
   </p:sldMasterIdLst>
   <p:notesMasterIdLst>
-    <p:notesMasterId r:id="rId9"/>
+    <p:notesMasterId r:id="rId10"/>
   </p:notesMasterIdLst>
   <p:handoutMasterIdLst>
-    <p:handoutMasterId r:id="rId10"/>
+    <p:handoutMasterId r:id="rId11"/>
   </p:handoutMasterIdLst>
   <p:sldIdLst>
     <p:sldId id="261" r:id="rId2"/>
     <p:sldId id="274" r:id="rId3"/>
     <p:sldId id="283" r:id="rId4"/>
-    <p:sldId id="277" r:id="rId5"/>
-    <p:sldId id="278" r:id="rId6"/>
-    <p:sldId id="284" r:id="rId7"/>
+    <p:sldId id="285" r:id="rId5"/>
+    <p:sldId id="277" r:id="rId6"/>
+    <p:sldId id="278" r:id="rId7"/>
     <p:sldId id="282" r:id="rId8"/>
+    <p:sldId id="284" r:id="rId9"/>
   </p:sldIdLst>
   <p:sldSz cx="12192000" cy="6858000"/>
   <p:notesSz cx="6858000" cy="9144000"/>
@@ -124,10 +125,11 @@
             <p14:sldId id="261"/>
             <p14:sldId id="274"/>
             <p14:sldId id="283"/>
+            <p14:sldId id="285"/>
             <p14:sldId id="277"/>
             <p14:sldId id="278"/>
+            <p14:sldId id="282"/>
             <p14:sldId id="284"/>
-            <p14:sldId id="282"/>
           </p14:sldIdLst>
         </p14:section>
       </p14:sectionLst>
@@ -235,7 +237,7 @@
           <a:p>
             <a:fld id="{59041DB8-B66F-4DC8-A96E-33677E0F90FF}" type="datetimeFigureOut">
               <a:rPr lang="en-US" smtClean="0"/>
-              <a:t>2/2/25</a:t>
+              <a:t>2/5/25</a:t>
             </a:fld>
             <a:endParaRPr lang="en-US"/>
           </a:p>
@@ -400,7 +402,7 @@
           <a:p>
             <a:fld id="{DEB49C4A-65AC-492D-9701-81B46C3AD0E4}" type="datetimeFigureOut">
               <a:rPr lang="en-US" smtClean="0"/>
-              <a:t>2/2/25</a:t>
+              <a:t>2/5/25</a:t>
             </a:fld>
             <a:endParaRPr lang="en-US"/>
           </a:p>
@@ -797,6 +799,102 @@
           <a:p>
             <a:r>
               <a:rPr lang="en-US" dirty="0"/>
+              <a:t>Need to understand this to make PS3 run in a reasonable amount of time</a:t>
+            </a:r>
+          </a:p>
+          <a:p>
+            <a:endParaRPr lang="en-US" dirty="0"/>
+          </a:p>
+          <a:p>
+            <a:r>
+              <a:rPr lang="en-US" dirty="0"/>
+              <a:t>Need to understand this to make future problem sets </a:t>
+            </a:r>
+          </a:p>
+        </p:txBody>
+      </p:sp>
+      <p:sp>
+        <p:nvSpPr>
+          <p:cNvPr id="4" name="Slide Number Placeholder 3"/>
+          <p:cNvSpPr>
+            <a:spLocks noGrp="1"/>
+          </p:cNvSpPr>
+          <p:nvPr>
+            <p:ph type="sldNum" sz="quarter" idx="5"/>
+          </p:nvPr>
+        </p:nvSpPr>
+        <p:spPr/>
+        <p:txBody>
+          <a:bodyPr/>
+          <a:lstStyle/>
+          <a:p>
+            <a:fld id="{82869989-EB00-4EE7-BCB5-25BDC5BB29F8}" type="slidenum">
+              <a:rPr lang="en-US" smtClean="0"/>
+              <a:t>5</a:t>
+            </a:fld>
+            <a:endParaRPr lang="en-US"/>
+          </a:p>
+        </p:txBody>
+      </p:sp>
+    </p:spTree>
+    <p:extLst>
+      <p:ext uri="{BB962C8B-B14F-4D97-AF65-F5344CB8AC3E}">
+        <p14:creationId xmlns:p14="http://schemas.microsoft.com/office/powerpoint/2010/main" val="3956501900"/>
+      </p:ext>
+    </p:extLst>
+  </p:cSld>
+  <p:clrMapOvr>
+    <a:masterClrMapping/>
+  </p:clrMapOvr>
+</p:notes>
+</file>
+
+<file path=ppt/notesSlides/notesSlide3.xml><?xml version="1.0" encoding="utf-8"?>
+<p:notes xmlns:a="http://schemas.openxmlformats.org/drawingml/2006/main" xmlns:r="http://schemas.openxmlformats.org/officeDocument/2006/relationships" xmlns:p="http://schemas.openxmlformats.org/presentationml/2006/main">
+  <p:cSld>
+    <p:spTree>
+      <p:nvGrpSpPr>
+        <p:cNvPr id="1" name=""/>
+        <p:cNvGrpSpPr/>
+        <p:nvPr/>
+      </p:nvGrpSpPr>
+      <p:grpSpPr>
+        <a:xfrm>
+          <a:off x="0" y="0"/>
+          <a:ext cx="0" cy="0"/>
+          <a:chOff x="0" y="0"/>
+          <a:chExt cx="0" cy="0"/>
+        </a:xfrm>
+      </p:grpSpPr>
+      <p:sp>
+        <p:nvSpPr>
+          <p:cNvPr id="2" name="Slide Image Placeholder 1"/>
+          <p:cNvSpPr>
+            <a:spLocks noGrp="1" noRot="1" noChangeAspect="1"/>
+          </p:cNvSpPr>
+          <p:nvPr>
+            <p:ph type="sldImg"/>
+          </p:nvPr>
+        </p:nvSpPr>
+        <p:spPr/>
+      </p:sp>
+      <p:sp>
+        <p:nvSpPr>
+          <p:cNvPr id="3" name="Notes Placeholder 2"/>
+          <p:cNvSpPr>
+            <a:spLocks noGrp="1"/>
+          </p:cNvSpPr>
+          <p:nvPr>
+            <p:ph type="body" idx="1"/>
+          </p:nvPr>
+        </p:nvSpPr>
+        <p:spPr/>
+        <p:txBody>
+          <a:bodyPr/>
+          <a:lstStyle/>
+          <a:p>
+            <a:r>
+              <a:rPr lang="en-US" dirty="0"/>
               <a:t>C/C++/Java/</a:t>
             </a:r>
             <a:r>
@@ -928,7 +1026,7 @@
           <a:p>
             <a:fld id="{82869989-EB00-4EE7-BCB5-25BDC5BB29F8}" type="slidenum">
               <a:rPr lang="en-US" smtClean="0"/>
-              <a:t>5</a:t>
+              <a:t>6</a:t>
             </a:fld>
             <a:endParaRPr lang="en-US"/>
           </a:p>
@@ -3088,7 +3186,7 @@
           <a:p>
             <a:fld id="{384A29A4-78C8-47AB-BA06-22CB45938951}" type="datetime1">
               <a:rPr lang="en-US" smtClean="0"/>
-              <a:t>2/2/25</a:t>
+              <a:t>2/5/25</a:t>
             </a:fld>
             <a:endParaRPr lang="en-US"/>
           </a:p>
@@ -3283,7 +3381,7 @@
           <a:p>
             <a:fld id="{E1ED4ACF-2D82-46F2-A8E9-23963AA34E86}" type="datetime1">
               <a:rPr lang="en-US" smtClean="0"/>
-              <a:t>2/2/25</a:t>
+              <a:t>2/5/25</a:t>
             </a:fld>
             <a:endParaRPr lang="en-US"/>
           </a:p>
@@ -3467,7 +3565,7 @@
           <a:p>
             <a:fld id="{AE374B5B-21A0-4192-BF4C-38187F1A68D8}" type="datetime1">
               <a:rPr lang="en-US" smtClean="0"/>
-              <a:t>2/2/25</a:t>
+              <a:t>2/5/25</a:t>
             </a:fld>
             <a:endParaRPr lang="en-US"/>
           </a:p>
@@ -5808,7 +5906,7 @@
           <a:p>
             <a:fld id="{33B5CF7C-B333-48E1-A4A6-83A3C8B73AC0}" type="datetime1">
               <a:rPr lang="en-US" smtClean="0"/>
-              <a:t>2/2/25</a:t>
+              <a:t>2/5/25</a:t>
             </a:fld>
             <a:endParaRPr lang="en-US"/>
           </a:p>
@@ -6261,7 +6359,7 @@
           <a:p>
             <a:fld id="{AE320762-5CBF-4210-AB54-376B091119F8}" type="datetime1">
               <a:rPr lang="en-US" smtClean="0"/>
-              <a:t>2/2/25</a:t>
+              <a:t>2/5/25</a:t>
             </a:fld>
             <a:endParaRPr lang="en-US"/>
           </a:p>
@@ -6393,7 +6491,7 @@
           <a:p>
             <a:fld id="{7F0DB371-BF5F-4058-A212-1A908E4D2674}" type="datetime1">
               <a:rPr lang="en-US" smtClean="0"/>
-              <a:t>2/2/25</a:t>
+              <a:t>2/5/25</a:t>
             </a:fld>
             <a:endParaRPr lang="en-US"/>
           </a:p>
@@ -8326,7 +8424,7 @@
           <a:p>
             <a:fld id="{60A4083B-90AA-48CF-BAD5-00AA24D7F288}" type="datetime1">
               <a:rPr lang="en-US" smtClean="0"/>
-              <a:t>2/2/25</a:t>
+              <a:t>2/5/25</a:t>
             </a:fld>
             <a:endParaRPr lang="en-US"/>
           </a:p>
@@ -10585,7 +10683,7 @@
             <a:fld id="{F5BAF629-ECA2-4CF3-B790-9D9BDED98269}" type="datetime1">
               <a:rPr lang="en-US" smtClean="0"/>
               <a:pPr/>
-              <a:t>2/2/25</a:t>
+              <a:t>2/5/25</a:t>
             </a:fld>
             <a:endParaRPr lang="en-US"/>
           </a:p>
@@ -14880,7 +14978,7 @@
             <a:fld id="{B51B2453-8663-4C69-AF73-9FD7B1DEC5D0}" type="datetime1">
               <a:rPr lang="en-US" smtClean="0"/>
               <a:pPr/>
-              <a:t>2/2/25</a:t>
+              <a:t>2/5/25</a:t>
             </a:fld>
             <a:endParaRPr lang="en-US" dirty="0"/>
           </a:p>
@@ -15585,6 +15683,12 @@
           <a:p>
             <a:r>
               <a:rPr lang="en-US" dirty="0"/>
+              <a:t>PS1 review: predictive power/correlation vs causality</a:t>
+            </a:r>
+          </a:p>
+          <a:p>
+            <a:r>
+              <a:rPr lang="en-US" dirty="0"/>
               <a:t>Vectorized computation + Matrix handling</a:t>
             </a:r>
           </a:p>
@@ -15639,6 +15743,129 @@
 </file>
 
 <file path=ppt/slides/slide4.xml><?xml version="1.0" encoding="utf-8"?>
+<p:sld xmlns:a="http://schemas.openxmlformats.org/drawingml/2006/main" xmlns:r="http://schemas.openxmlformats.org/officeDocument/2006/relationships" xmlns:p="http://schemas.openxmlformats.org/presentationml/2006/main">
+  <p:cSld>
+    <p:spTree>
+      <p:nvGrpSpPr>
+        <p:cNvPr id="1" name=""/>
+        <p:cNvGrpSpPr/>
+        <p:nvPr/>
+      </p:nvGrpSpPr>
+      <p:grpSpPr>
+        <a:xfrm>
+          <a:off x="0" y="0"/>
+          <a:ext cx="0" cy="0"/>
+          <a:chOff x="0" y="0"/>
+          <a:chExt cx="0" cy="0"/>
+        </a:xfrm>
+      </p:grpSpPr>
+      <p:sp>
+        <p:nvSpPr>
+          <p:cNvPr id="2" name="Title 1">
+            <a:extLst>
+              <a:ext uri="{FF2B5EF4-FFF2-40B4-BE49-F238E27FC236}">
+                <a16:creationId xmlns:a16="http://schemas.microsoft.com/office/drawing/2014/main" id="{BDE6B6D5-3AF5-EB09-6A40-55807533025A}"/>
+              </a:ext>
+            </a:extLst>
+          </p:cNvPr>
+          <p:cNvSpPr>
+            <a:spLocks noGrp="1"/>
+          </p:cNvSpPr>
+          <p:nvPr>
+            <p:ph type="title"/>
+          </p:nvPr>
+        </p:nvSpPr>
+        <p:spPr/>
+        <p:txBody>
+          <a:bodyPr/>
+          <a:lstStyle/>
+          <a:p>
+            <a:r>
+              <a:rPr lang="en-US" dirty="0"/>
+              <a:t>Predictive power vs causality</a:t>
+            </a:r>
+          </a:p>
+        </p:txBody>
+      </p:sp>
+      <p:sp>
+        <p:nvSpPr>
+          <p:cNvPr id="3" name="Content Placeholder 2">
+            <a:extLst>
+              <a:ext uri="{FF2B5EF4-FFF2-40B4-BE49-F238E27FC236}">
+                <a16:creationId xmlns:a16="http://schemas.microsoft.com/office/drawing/2014/main" id="{4EA30F87-958C-F8DC-8A0C-3CBAD90B8520}"/>
+              </a:ext>
+            </a:extLst>
+          </p:cNvPr>
+          <p:cNvSpPr>
+            <a:spLocks noGrp="1"/>
+          </p:cNvSpPr>
+          <p:nvPr>
+            <p:ph idx="1"/>
+          </p:nvPr>
+        </p:nvSpPr>
+        <p:spPr/>
+        <p:txBody>
+          <a:bodyPr/>
+          <a:lstStyle/>
+          <a:p>
+            <a:r>
+              <a:rPr lang="en-US" dirty="0"/>
+              <a:t>You observe that when sidewalks are wet, the grass near them is also wet. A regression of the number of days with wet sidewalks on the number of days with wet grass has a high R</a:t>
+            </a:r>
+            <a:r>
+              <a:rPr lang="en-US" baseline="30000" dirty="0"/>
+              <a:t>2</a:t>
+            </a:r>
+            <a:r>
+              <a:rPr lang="en-US" dirty="0"/>
+              <a:t>. </a:t>
+            </a:r>
+            <a:r>
+              <a:rPr lang="en-US" b="1" dirty="0"/>
+              <a:t>Is there a causal relationship between the two?</a:t>
+            </a:r>
+          </a:p>
+          <a:p>
+            <a:endParaRPr lang="en-US" baseline="30000" dirty="0"/>
+          </a:p>
+          <a:p>
+            <a:r>
+              <a:rPr lang="en-US" dirty="0"/>
+              <a:t>You use a treatment vs control design to estimate the effect of a new medication on heart disease incidence. You perfect comparability of treatment and control groups at baseline and perfect compliance with treatment. The coefficient on a treatment indicator in a regression with appropriate controls is -0.001 (taking the new medication reduces the chances of heart disease by 0.1%), and is precisely specified. </a:t>
+            </a:r>
+            <a:r>
+              <a:rPr lang="en-US" b="1" dirty="0"/>
+              <a:t>Does this coefficient have a causal estimate?</a:t>
+            </a:r>
+          </a:p>
+        </p:txBody>
+      </p:sp>
+    </p:spTree>
+    <p:extLst>
+      <p:ext uri="{BB962C8B-B14F-4D97-AF65-F5344CB8AC3E}">
+        <p14:creationId xmlns:p14="http://schemas.microsoft.com/office/powerpoint/2010/main" val="1465513191"/>
+      </p:ext>
+    </p:extLst>
+  </p:cSld>
+  <p:clrMapOvr>
+    <a:masterClrMapping/>
+  </p:clrMapOvr>
+  <mc:AlternateContent xmlns:mc="http://schemas.openxmlformats.org/markup-compatibility/2006" xmlns:p14="http://schemas.microsoft.com/office/powerpoint/2010/main">
+    <mc:Choice Requires="p14">
+      <p:transition spd="med" p14:dur="700">
+        <p:fade/>
+      </p:transition>
+    </mc:Choice>
+    <mc:Fallback xmlns="">
+      <p:transition spd="med">
+        <p:fade/>
+      </p:transition>
+    </mc:Fallback>
+  </mc:AlternateContent>
+</p:sld>
+</file>
+
+<file path=ppt/slides/slide5.xml><?xml version="1.0" encoding="utf-8"?>
 <p:sld xmlns:a="http://schemas.openxmlformats.org/drawingml/2006/main" xmlns:r="http://schemas.openxmlformats.org/officeDocument/2006/relationships" xmlns:p="http://schemas.openxmlformats.org/presentationml/2006/main">
   <p:cSld>
     <p:spTree>
@@ -15955,7 +16182,7 @@
           <a:p>
             <a:r>
               <a:rPr lang="en-US" dirty="0"/>
-              <a:t>Efficient vectorized computation</a:t>
+              <a:t>Efficient vectorized computation – operate on arrays of data in one shot</a:t>
             </a:r>
           </a:p>
           <a:p>
@@ -16032,7 +16259,7 @@
 </p:sld>
 </file>
 
-<file path=ppt/slides/slide5.xml><?xml version="1.0" encoding="utf-8"?>
+<file path=ppt/slides/slide6.xml><?xml version="1.0" encoding="utf-8"?>
 <p:sld xmlns:a="http://schemas.openxmlformats.org/drawingml/2006/main" xmlns:r="http://schemas.openxmlformats.org/officeDocument/2006/relationships" xmlns:p="http://schemas.openxmlformats.org/presentationml/2006/main">
   <p:cSld>
     <p:spTree>
@@ -16679,101 +16906,6 @@
 </p:sld>
 </file>
 
-<file path=ppt/slides/slide6.xml><?xml version="1.0" encoding="utf-8"?>
-<p:sld xmlns:a="http://schemas.openxmlformats.org/drawingml/2006/main" xmlns:r="http://schemas.openxmlformats.org/officeDocument/2006/relationships" xmlns:p="http://schemas.openxmlformats.org/presentationml/2006/main">
-  <p:cSld>
-    <p:spTree>
-      <p:nvGrpSpPr>
-        <p:cNvPr id="1" name=""/>
-        <p:cNvGrpSpPr/>
-        <p:nvPr/>
-      </p:nvGrpSpPr>
-      <p:grpSpPr>
-        <a:xfrm>
-          <a:off x="0" y="0"/>
-          <a:ext cx="0" cy="0"/>
-          <a:chOff x="0" y="0"/>
-          <a:chExt cx="0" cy="0"/>
-        </a:xfrm>
-      </p:grpSpPr>
-      <p:sp>
-        <p:nvSpPr>
-          <p:cNvPr id="2" name="Title 1">
-            <a:extLst>
-              <a:ext uri="{FF2B5EF4-FFF2-40B4-BE49-F238E27FC236}">
-                <a16:creationId xmlns:a16="http://schemas.microsoft.com/office/drawing/2014/main" id="{EA850727-18D9-C500-6269-15A186F46B2B}"/>
-              </a:ext>
-            </a:extLst>
-          </p:cNvPr>
-          <p:cNvSpPr>
-            <a:spLocks noGrp="1"/>
-          </p:cNvSpPr>
-          <p:nvPr>
-            <p:ph type="title"/>
-          </p:nvPr>
-        </p:nvSpPr>
-        <p:spPr/>
-        <p:txBody>
-          <a:bodyPr/>
-          <a:lstStyle/>
-          <a:p>
-            <a:r>
-              <a:rPr lang="en-US" i="1" dirty="0"/>
-              <a:t>live coding</a:t>
-            </a:r>
-          </a:p>
-        </p:txBody>
-      </p:sp>
-      <p:sp>
-        <p:nvSpPr>
-          <p:cNvPr id="3" name="Content Placeholder 2">
-            <a:extLst>
-              <a:ext uri="{FF2B5EF4-FFF2-40B4-BE49-F238E27FC236}">
-                <a16:creationId xmlns:a16="http://schemas.microsoft.com/office/drawing/2014/main" id="{3DBCF272-44BC-BAD1-A216-88134E5C1D15}"/>
-              </a:ext>
-            </a:extLst>
-          </p:cNvPr>
-          <p:cNvSpPr>
-            <a:spLocks noGrp="1"/>
-          </p:cNvSpPr>
-          <p:nvPr>
-            <p:ph idx="1"/>
-          </p:nvPr>
-        </p:nvSpPr>
-        <p:spPr/>
-        <p:txBody>
-          <a:bodyPr/>
-          <a:lstStyle/>
-          <a:p>
-            <a:endParaRPr lang="en-US"/>
-          </a:p>
-        </p:txBody>
-      </p:sp>
-    </p:spTree>
-    <p:extLst>
-      <p:ext uri="{BB962C8B-B14F-4D97-AF65-F5344CB8AC3E}">
-        <p14:creationId xmlns:p14="http://schemas.microsoft.com/office/powerpoint/2010/main" val="2956668613"/>
-      </p:ext>
-    </p:extLst>
-  </p:cSld>
-  <p:clrMapOvr>
-    <a:masterClrMapping/>
-  </p:clrMapOvr>
-  <mc:AlternateContent xmlns:mc="http://schemas.openxmlformats.org/markup-compatibility/2006" xmlns:p14="http://schemas.microsoft.com/office/powerpoint/2010/main">
-    <mc:Choice Requires="p14">
-      <p:transition spd="med" p14:dur="700">
-        <p:fade/>
-      </p:transition>
-    </mc:Choice>
-    <mc:Fallback xmlns="">
-      <p:transition spd="med">
-        <p:fade/>
-      </p:transition>
-    </mc:Fallback>
-  </mc:AlternateContent>
-</p:sld>
-</file>
-
 <file path=ppt/slides/slide7.xml><?xml version="1.0" encoding="utf-8"?>
 <p:sld xmlns:a="http://schemas.openxmlformats.org/drawingml/2006/main" xmlns:r="http://schemas.openxmlformats.org/officeDocument/2006/relationships" xmlns:p="http://schemas.openxmlformats.org/presentationml/2006/main">
   <p:cSld>
@@ -17061,6 +17193,101 @@
     <p:extLst>
       <p:ext uri="{BB962C8B-B14F-4D97-AF65-F5344CB8AC3E}">
         <p14:creationId xmlns:p14="http://schemas.microsoft.com/office/powerpoint/2010/main" val="2896339728"/>
+      </p:ext>
+    </p:extLst>
+  </p:cSld>
+  <p:clrMapOvr>
+    <a:masterClrMapping/>
+  </p:clrMapOvr>
+  <mc:AlternateContent xmlns:mc="http://schemas.openxmlformats.org/markup-compatibility/2006" xmlns:p14="http://schemas.microsoft.com/office/powerpoint/2010/main">
+    <mc:Choice Requires="p14">
+      <p:transition spd="med" p14:dur="700">
+        <p:fade/>
+      </p:transition>
+    </mc:Choice>
+    <mc:Fallback xmlns="">
+      <p:transition spd="med">
+        <p:fade/>
+      </p:transition>
+    </mc:Fallback>
+  </mc:AlternateContent>
+</p:sld>
+</file>
+
+<file path=ppt/slides/slide8.xml><?xml version="1.0" encoding="utf-8"?>
+<p:sld xmlns:a="http://schemas.openxmlformats.org/drawingml/2006/main" xmlns:r="http://schemas.openxmlformats.org/officeDocument/2006/relationships" xmlns:p="http://schemas.openxmlformats.org/presentationml/2006/main">
+  <p:cSld>
+    <p:spTree>
+      <p:nvGrpSpPr>
+        <p:cNvPr id="1" name=""/>
+        <p:cNvGrpSpPr/>
+        <p:nvPr/>
+      </p:nvGrpSpPr>
+      <p:grpSpPr>
+        <a:xfrm>
+          <a:off x="0" y="0"/>
+          <a:ext cx="0" cy="0"/>
+          <a:chOff x="0" y="0"/>
+          <a:chExt cx="0" cy="0"/>
+        </a:xfrm>
+      </p:grpSpPr>
+      <p:sp>
+        <p:nvSpPr>
+          <p:cNvPr id="2" name="Title 1">
+            <a:extLst>
+              <a:ext uri="{FF2B5EF4-FFF2-40B4-BE49-F238E27FC236}">
+                <a16:creationId xmlns:a16="http://schemas.microsoft.com/office/drawing/2014/main" id="{EA850727-18D9-C500-6269-15A186F46B2B}"/>
+              </a:ext>
+            </a:extLst>
+          </p:cNvPr>
+          <p:cNvSpPr>
+            <a:spLocks noGrp="1"/>
+          </p:cNvSpPr>
+          <p:nvPr>
+            <p:ph type="title"/>
+          </p:nvPr>
+        </p:nvSpPr>
+        <p:spPr/>
+        <p:txBody>
+          <a:bodyPr/>
+          <a:lstStyle/>
+          <a:p>
+            <a:r>
+              <a:rPr lang="en-US" i="1" dirty="0"/>
+              <a:t>live coding</a:t>
+            </a:r>
+          </a:p>
+        </p:txBody>
+      </p:sp>
+      <p:sp>
+        <p:nvSpPr>
+          <p:cNvPr id="3" name="Content Placeholder 2">
+            <a:extLst>
+              <a:ext uri="{FF2B5EF4-FFF2-40B4-BE49-F238E27FC236}">
+                <a16:creationId xmlns:a16="http://schemas.microsoft.com/office/drawing/2014/main" id="{3DBCF272-44BC-BAD1-A216-88134E5C1D15}"/>
+              </a:ext>
+            </a:extLst>
+          </p:cNvPr>
+          <p:cNvSpPr>
+            <a:spLocks noGrp="1"/>
+          </p:cNvSpPr>
+          <p:nvPr>
+            <p:ph idx="1"/>
+          </p:nvPr>
+        </p:nvSpPr>
+        <p:spPr/>
+        <p:txBody>
+          <a:bodyPr/>
+          <a:lstStyle/>
+          <a:p>
+            <a:endParaRPr lang="en-US"/>
+          </a:p>
+        </p:txBody>
+      </p:sp>
+    </p:spTree>
+    <p:extLst>
+      <p:ext uri="{BB962C8B-B14F-4D97-AF65-F5344CB8AC3E}">
+        <p14:creationId xmlns:p14="http://schemas.microsoft.com/office/powerpoint/2010/main" val="2956668613"/>
       </p:ext>
     </p:extLst>
   </p:cSld>

</xml_diff>

<commit_message>
update lab03 slides and upload lab00 solutions
</commit_message>
<xml_diff>
--- a/labs/lab03/Lab3.pptx
+++ b/labs/lab03/Lab3.pptx
@@ -15835,8 +15835,13 @@
             </a:r>
             <a:r>
               <a:rPr lang="en-US" b="1" dirty="0"/>
-              <a:t>Does this coefficient have a causal estimate?</a:t>
+              <a:t>Does this coefficient have a </a:t>
             </a:r>
+            <a:r>
+              <a:rPr lang="en-US" b="1"/>
+              <a:t>causal interpretation?</a:t>
+            </a:r>
+            <a:endParaRPr lang="en-US" b="1" dirty="0"/>
           </a:p>
         </p:txBody>
       </p:sp>

</xml_diff>